<commit_message>
[CCORDERO]remove script added and poster
</commit_message>
<xml_diff>
--- a/Poster.pptx
+++ b/Poster.pptx
@@ -320,7 +320,7 @@
             <a:fld id="{1B822968-E4F8-D348-905F-D6EFED080D17}" type="datetimeFigureOut">
               <a:rPr lang="es-ES" smtClean="0"/>
               <a:pPr/>
-              <a:t>11/11/19</a:t>
+              <a:t>20/11/2019</a:t>
             </a:fld>
             <a:endParaRPr lang="es-ES"/>
           </a:p>
@@ -492,7 +492,7 @@
             <a:fld id="{1B822968-E4F8-D348-905F-D6EFED080D17}" type="datetimeFigureOut">
               <a:rPr lang="es-ES" smtClean="0"/>
               <a:pPr/>
-              <a:t>11/11/19</a:t>
+              <a:t>20/11/2019</a:t>
             </a:fld>
             <a:endParaRPr lang="es-ES"/>
           </a:p>
@@ -674,7 +674,7 @@
             <a:fld id="{1B822968-E4F8-D348-905F-D6EFED080D17}" type="datetimeFigureOut">
               <a:rPr lang="es-ES" smtClean="0"/>
               <a:pPr/>
-              <a:t>11/11/19</a:t>
+              <a:t>20/11/2019</a:t>
             </a:fld>
             <a:endParaRPr lang="es-ES"/>
           </a:p>
@@ -846,7 +846,7 @@
             <a:fld id="{1B822968-E4F8-D348-905F-D6EFED080D17}" type="datetimeFigureOut">
               <a:rPr lang="es-ES" smtClean="0"/>
               <a:pPr/>
-              <a:t>11/11/19</a:t>
+              <a:t>20/11/2019</a:t>
             </a:fld>
             <a:endParaRPr lang="es-ES"/>
           </a:p>
@@ -1094,7 +1094,7 @@
             <a:fld id="{1B822968-E4F8-D348-905F-D6EFED080D17}" type="datetimeFigureOut">
               <a:rPr lang="es-ES" smtClean="0"/>
               <a:pPr/>
-              <a:t>11/11/19</a:t>
+              <a:t>20/11/2019</a:t>
             </a:fld>
             <a:endParaRPr lang="es-ES"/>
           </a:p>
@@ -1384,7 +1384,7 @@
             <a:fld id="{1B822968-E4F8-D348-905F-D6EFED080D17}" type="datetimeFigureOut">
               <a:rPr lang="es-ES" smtClean="0"/>
               <a:pPr/>
-              <a:t>11/11/19</a:t>
+              <a:t>20/11/2019</a:t>
             </a:fld>
             <a:endParaRPr lang="es-ES"/>
           </a:p>
@@ -1813,7 +1813,7 @@
             <a:fld id="{1B822968-E4F8-D348-905F-D6EFED080D17}" type="datetimeFigureOut">
               <a:rPr lang="es-ES" smtClean="0"/>
               <a:pPr/>
-              <a:t>11/11/19</a:t>
+              <a:t>20/11/2019</a:t>
             </a:fld>
             <a:endParaRPr lang="es-ES"/>
           </a:p>
@@ -1933,7 +1933,7 @@
             <a:fld id="{1B822968-E4F8-D348-905F-D6EFED080D17}" type="datetimeFigureOut">
               <a:rPr lang="es-ES" smtClean="0"/>
               <a:pPr/>
-              <a:t>11/11/19</a:t>
+              <a:t>20/11/2019</a:t>
             </a:fld>
             <a:endParaRPr lang="es-ES"/>
           </a:p>
@@ -2030,7 +2030,7 @@
             <a:fld id="{1B822968-E4F8-D348-905F-D6EFED080D17}" type="datetimeFigureOut">
               <a:rPr lang="es-ES" smtClean="0"/>
               <a:pPr/>
-              <a:t>11/11/19</a:t>
+              <a:t>20/11/2019</a:t>
             </a:fld>
             <a:endParaRPr lang="es-ES"/>
           </a:p>
@@ -2309,7 +2309,7 @@
             <a:fld id="{1B822968-E4F8-D348-905F-D6EFED080D17}" type="datetimeFigureOut">
               <a:rPr lang="es-ES" smtClean="0"/>
               <a:pPr/>
-              <a:t>11/11/19</a:t>
+              <a:t>20/11/2019</a:t>
             </a:fld>
             <a:endParaRPr lang="es-ES"/>
           </a:p>
@@ -2564,7 +2564,7 @@
             <a:fld id="{1B822968-E4F8-D348-905F-D6EFED080D17}" type="datetimeFigureOut">
               <a:rPr lang="es-ES" smtClean="0"/>
               <a:pPr/>
-              <a:t>11/11/19</a:t>
+              <a:t>20/11/2019</a:t>
             </a:fld>
             <a:endParaRPr lang="es-ES"/>
           </a:p>
@@ -2808,7 +2808,7 @@
             <a:fld id="{1B822968-E4F8-D348-905F-D6EFED080D17}" type="datetimeFigureOut">
               <a:rPr lang="es-ES" smtClean="0"/>
               <a:pPr/>
-              <a:t>11/11/19</a:t>
+              <a:t>20/11/2019</a:t>
             </a:fld>
             <a:endParaRPr lang="es-ES"/>
           </a:p>
@@ -3279,14 +3279,24 @@
           <a:p>
             <a:pPr algn="ctr"/>
             <a:r>
-              <a:rPr lang="es-ES_tradnl" sz="3600" b="1" dirty="0">
+              <a:rPr lang="es-ES_tradnl" sz="3600" dirty="0">
                 <a:solidFill>
                   <a:srgbClr val="00426F"/>
                 </a:solidFill>
                 <a:latin typeface="Times New Roman" panose="02020603050405020304" pitchFamily="18" charset="0"/>
                 <a:cs typeface="Times New Roman" panose="02020603050405020304" pitchFamily="18" charset="0"/>
               </a:rPr>
-              <a:t>Trabajo a Futuro</a:t>
+              <a:t>Future </a:t>
+            </a:r>
+            <a:r>
+              <a:rPr lang="es-ES_tradnl" sz="3600" dirty="0" err="1">
+                <a:solidFill>
+                  <a:srgbClr val="00426F"/>
+                </a:solidFill>
+                <a:latin typeface="Times New Roman" panose="02020603050405020304" pitchFamily="18" charset="0"/>
+                <a:cs typeface="Times New Roman" panose="02020603050405020304" pitchFamily="18" charset="0"/>
+              </a:rPr>
+              <a:t>Work</a:t>
             </a:r>
             <a:endParaRPr lang="es-ES_tradnl" sz="3600" dirty="0">
               <a:solidFill>
@@ -3354,11 +3364,19 @@
           </a:bodyPr>
           <a:lstStyle/>
           <a:p>
-            <a:pPr algn="just"/>
-            <a:r>
-              <a:rPr lang="es-ES_tradnl" sz="2400" dirty="0"/>
-              <a:t>En esta sección se presenta lo que hace falta para llevar a buen término el Trabajo de Obtención de Grado en la IDI-IV, para con ello cumplir con el objetivo que se ha planteado.</a:t>
-            </a:r>
+            <a:r>
+              <a:rPr lang="en-US" sz="2400" dirty="0"/>
+              <a:t>The goal is to create a system with three or four CNN followed by a Fully-Connected Network. Some of this CNNs are going to be Hybrid models. Such models are going to be InseptionV3, </a:t>
+            </a:r>
+            <a:r>
+              <a:rPr lang="en-US" sz="2400" dirty="0" err="1"/>
+              <a:t>Xception</a:t>
+            </a:r>
+            <a:r>
+              <a:rPr lang="en-US" sz="2400" dirty="0"/>
+              <a:t>, and a ResNet-152. </a:t>
+            </a:r>
+            <a:endParaRPr lang="es-MX" sz="2400" dirty="0"/>
           </a:p>
           <a:p>
             <a:pPr algn="just"/>
@@ -3549,14 +3567,14 @@
           <a:p>
             <a:pPr algn="ctr"/>
             <a:r>
-              <a:rPr lang="es-ES_tradnl" sz="3600" b="1" dirty="0">
+              <a:rPr lang="es-ES_tradnl" sz="3600" b="1" dirty="0" err="1">
                 <a:solidFill>
                   <a:srgbClr val="00426F"/>
                 </a:solidFill>
                 <a:latin typeface="Times New Roman" panose="02020603050405020304" pitchFamily="18" charset="0"/>
                 <a:cs typeface="Times New Roman" panose="02020603050405020304" pitchFamily="18" charset="0"/>
               </a:rPr>
-              <a:t>Resumen</a:t>
+              <a:t>Summary</a:t>
             </a:r>
             <a:endParaRPr lang="es-ES_tradnl" sz="3600" dirty="0">
               <a:solidFill>
@@ -3618,11 +3636,41 @@
           </a:bodyPr>
           <a:lstStyle/>
           <a:p>
-            <a:pPr algn="just"/>
-            <a:r>
-              <a:rPr lang="es-ES_tradnl" sz="2400" dirty="0"/>
-              <a:t>En esta sección se presenta el resumen del Trabajo de Obtención de Grado, el cual contiene la descripción general de la información que se presenta en el póster.</a:t>
-            </a:r>
+            <a:r>
+              <a:rPr lang="en-US" sz="2400" dirty="0"/>
+              <a:t>* The project is about classification of satellite Images. The images to classify are provided by a Functional Map of the World (</a:t>
+            </a:r>
+            <a:r>
+              <a:rPr lang="en-US" sz="2400" dirty="0" err="1"/>
+              <a:t>fMoW</a:t>
+            </a:r>
+            <a:r>
+              <a:rPr lang="en-US" sz="2400" dirty="0"/>
+              <a:t>) database originally provided for a contest in 2017, such database is separated in 62 classes.</a:t>
+            </a:r>
+            <a:endParaRPr lang="es-MX" sz="2400" dirty="0"/>
+          </a:p>
+          <a:p>
+            <a:r>
+              <a:rPr lang="en-US" sz="2400" dirty="0"/>
+              <a:t>* Many problems are related with satellite images, some of them caused by the database other ones because the processing and in this project, I try to face all of them in order to perform a correct classification using Deep Learning.</a:t>
+            </a:r>
+            <a:endParaRPr lang="es-MX" sz="2400" dirty="0"/>
+          </a:p>
+          <a:p>
+            <a:r>
+              <a:rPr lang="en-US" sz="2400" dirty="0"/>
+              <a:t>* The strategy taken was based on a paper published by Mark Pritt [1] where four different architectures are used to and the output of such four architectures is averaged and a </a:t>
+            </a:r>
+            <a:r>
+              <a:rPr lang="en-US" sz="2400" dirty="0" err="1"/>
+              <a:t>maxpooling</a:t>
+            </a:r>
+            <a:r>
+              <a:rPr lang="en-US" sz="2400" dirty="0"/>
+              <a:t> determines the class. The system is focused in investing few memory and time and to achieve that the systems are pretrained using ImageNet Database and the architectures are a Convolutional Neural Network (CNN) followed by a Fully-Connected network, the CNN is trained using just one epoch and the Fully-Connected with approximately 20 epochs. At this moment the scope of the project is just use one architecture and analyze how to improve its results. Further investigation will be done to incorporate another 3 architectures.</a:t>
+            </a:r>
+            <a:endParaRPr lang="es-MX" sz="2400" dirty="0"/>
           </a:p>
         </p:txBody>
       </p:sp>
@@ -3778,7 +3826,7 @@
         <p:spPr>
           <a:xfrm>
             <a:off x="3260452" y="3946676"/>
-            <a:ext cx="15122440" cy="1384995"/>
+            <a:ext cx="15122440" cy="954107"/>
           </a:xfrm>
           <a:prstGeom prst="rect">
             <a:avLst/>
@@ -3800,7 +3848,7 @@
           <a:p>
             <a:pPr algn="ctr"/>
             <a:r>
-              <a:rPr lang="es-ES_tradnl" sz="2800" b="1">
+              <a:rPr lang="es-ES_tradnl" sz="2800" b="1" dirty="0">
                 <a:solidFill>
                   <a:schemeClr val="tx2">
                     <a:lumMod val="75000"/>
@@ -3809,10 +3857,10 @@
                 <a:latin typeface="Times New Roman" panose="02020603050405020304" pitchFamily="18" charset="0"/>
                 <a:cs typeface="Times New Roman" panose="02020603050405020304" pitchFamily="18" charset="0"/>
               </a:rPr>
-              <a:t>Nombre del Alumno, </a:t>
-            </a:r>
-            <a:r>
-              <a:rPr lang="es-ES_tradnl" sz="2800" b="1" i="1">
+              <a:t>Carlos Alberto Cordero </a:t>
+            </a:r>
+            <a:r>
+              <a:rPr lang="es-ES_tradnl" sz="2800" b="1" dirty="0" err="1">
                 <a:solidFill>
                   <a:schemeClr val="tx2">
                     <a:lumMod val="75000"/>
@@ -3821,13 +3869,10 @@
                 <a:latin typeface="Times New Roman" panose="02020603050405020304" pitchFamily="18" charset="0"/>
                 <a:cs typeface="Times New Roman" panose="02020603050405020304" pitchFamily="18" charset="0"/>
               </a:rPr>
-              <a:t>ms000000@iteso.mx</a:t>
-            </a:r>
-          </a:p>
-          <a:p>
-            <a:pPr algn="ctr"/>
-            <a:r>
-              <a:rPr lang="es-ES_tradnl" sz="2800" b="1">
+              <a:t>Robles,</a:t>
+            </a:r>
+            <a:r>
+              <a:rPr lang="es-ES_tradnl" sz="2800" b="1" dirty="0">
                 <a:solidFill>
                   <a:schemeClr val="tx2">
                     <a:lumMod val="75000"/>
@@ -3836,10 +3881,10 @@
                 <a:latin typeface="Times New Roman" panose="02020603050405020304" pitchFamily="18" charset="0"/>
                 <a:cs typeface="Times New Roman" panose="02020603050405020304" pitchFamily="18" charset="0"/>
               </a:rPr>
-              <a:t>Nombre del Director de TOG, </a:t>
-            </a:r>
-            <a:r>
-              <a:rPr lang="es-ES_tradnl" sz="2800" b="1" i="1">
+              <a:t> </a:t>
+            </a:r>
+            <a:r>
+              <a:rPr lang="es-ES_tradnl" sz="2800" b="1" i="1" dirty="0">
                 <a:solidFill>
                   <a:schemeClr val="tx2">
                     <a:lumMod val="75000"/>
@@ -3848,13 +3893,13 @@
                 <a:latin typeface="Times New Roman" panose="02020603050405020304" pitchFamily="18" charset="0"/>
                 <a:cs typeface="Times New Roman" panose="02020603050405020304" pitchFamily="18" charset="0"/>
               </a:rPr>
-              <a:t>profesor@iteso.mx</a:t>
+              <a:t>ms197686@iteso.mx</a:t>
             </a:r>
           </a:p>
           <a:p>
             <a:pPr algn="ctr"/>
             <a:r>
-              <a:rPr lang="es-ES_tradnl" sz="2800" b="1">
+              <a:rPr lang="es-ES_tradnl" sz="2800" b="1" dirty="0">
                 <a:solidFill>
                   <a:schemeClr val="tx2">
                     <a:lumMod val="75000"/>
@@ -3863,10 +3908,10 @@
                 <a:latin typeface="Times New Roman" panose="02020603050405020304" pitchFamily="18" charset="0"/>
                 <a:cs typeface="Times New Roman" panose="02020603050405020304" pitchFamily="18" charset="0"/>
               </a:rPr>
-              <a:t>Nombre del Co-Director de TOG, </a:t>
-            </a:r>
-            <a:r>
-              <a:rPr lang="es-ES_tradnl" sz="2800" b="1" i="1">
+              <a:t>Iván Esteban Villalón Turrubiates, </a:t>
+            </a:r>
+            <a:r>
+              <a:rPr lang="es-ES_tradnl" sz="2800" b="1" i="1" dirty="0">
                 <a:solidFill>
                   <a:schemeClr val="tx2">
                     <a:lumMod val="75000"/>
@@ -3875,7 +3920,7 @@
                 <a:latin typeface="Times New Roman" panose="02020603050405020304" pitchFamily="18" charset="0"/>
                 <a:cs typeface="Times New Roman" panose="02020603050405020304" pitchFamily="18" charset="0"/>
               </a:rPr>
-              <a:t>profesor@iteso.mx</a:t>
+              <a:t>villalon@iteso.mx</a:t>
             </a:r>
           </a:p>
         </p:txBody>
@@ -3911,7 +3956,7 @@
           <a:p>
             <a:pPr algn="ctr"/>
             <a:r>
-              <a:rPr lang="es-ES_tradnl" sz="3600" b="1" dirty="0">
+              <a:rPr lang="en-US" sz="3600" b="1" dirty="0">
                 <a:solidFill>
                   <a:schemeClr val="tx2">
                     <a:lumMod val="75000"/>
@@ -3920,8 +3965,17 @@
                 <a:latin typeface="Times New Roman" panose="02020603050405020304" pitchFamily="18" charset="0"/>
                 <a:cs typeface="Times New Roman" panose="02020603050405020304" pitchFamily="18" charset="0"/>
               </a:rPr>
-              <a:t>Nombre del Trabajo de Obtención de Grado</a:t>
-            </a:r>
+              <a:t>Satellite Image Classification with Deep Learning</a:t>
+            </a:r>
+            <a:endParaRPr lang="es-ES_tradnl" sz="3600" b="1" dirty="0">
+              <a:solidFill>
+                <a:schemeClr val="tx2">
+                  <a:lumMod val="75000"/>
+                </a:schemeClr>
+              </a:solidFill>
+              <a:latin typeface="Times New Roman" panose="02020603050405020304" pitchFamily="18" charset="0"/>
+              <a:cs typeface="Times New Roman" panose="02020603050405020304" pitchFamily="18" charset="0"/>
+            </a:endParaRPr>
           </a:p>
           <a:p>
             <a:pPr algn="ctr"/>
@@ -3973,6 +4027,16 @@
           <a:p>
             <a:pPr algn="ctr"/>
             <a:r>
+              <a:rPr lang="es-ES_tradnl" sz="3600" b="1" dirty="0" err="1">
+                <a:solidFill>
+                  <a:srgbClr val="00426F"/>
+                </a:solidFill>
+                <a:latin typeface="Times New Roman" panose="02020603050405020304" pitchFamily="18" charset="0"/>
+                <a:cs typeface="Times New Roman" panose="02020603050405020304" pitchFamily="18" charset="0"/>
+              </a:rPr>
+              <a:t>Introduction</a:t>
+            </a:r>
+            <a:r>
               <a:rPr lang="es-ES_tradnl" sz="3600" b="1" dirty="0">
                 <a:solidFill>
                   <a:srgbClr val="00426F"/>
@@ -3980,7 +4044,77 @@
                 <a:latin typeface="Times New Roman" panose="02020603050405020304" pitchFamily="18" charset="0"/>
                 <a:cs typeface="Times New Roman" panose="02020603050405020304" pitchFamily="18" charset="0"/>
               </a:rPr>
-              <a:t>Introducción y Descripción del Problema</a:t>
+              <a:t> and </a:t>
+            </a:r>
+            <a:r>
+              <a:rPr lang="es-ES_tradnl" sz="3600" b="1" dirty="0" err="1">
+                <a:solidFill>
+                  <a:srgbClr val="00426F"/>
+                </a:solidFill>
+                <a:latin typeface="Times New Roman" panose="02020603050405020304" pitchFamily="18" charset="0"/>
+                <a:cs typeface="Times New Roman" panose="02020603050405020304" pitchFamily="18" charset="0"/>
+              </a:rPr>
+              <a:t>description</a:t>
+            </a:r>
+            <a:r>
+              <a:rPr lang="es-ES_tradnl" sz="3600" b="1" dirty="0">
+                <a:solidFill>
+                  <a:srgbClr val="00426F"/>
+                </a:solidFill>
+                <a:latin typeface="Times New Roman" panose="02020603050405020304" pitchFamily="18" charset="0"/>
+                <a:cs typeface="Times New Roman" panose="02020603050405020304" pitchFamily="18" charset="0"/>
+              </a:rPr>
+              <a:t> </a:t>
+            </a:r>
+            <a:r>
+              <a:rPr lang="es-ES_tradnl" sz="3600" b="1" dirty="0" err="1">
+                <a:solidFill>
+                  <a:srgbClr val="00426F"/>
+                </a:solidFill>
+                <a:latin typeface="Times New Roman" panose="02020603050405020304" pitchFamily="18" charset="0"/>
+                <a:cs typeface="Times New Roman" panose="02020603050405020304" pitchFamily="18" charset="0"/>
+              </a:rPr>
+              <a:t>of</a:t>
+            </a:r>
+            <a:r>
+              <a:rPr lang="es-ES_tradnl" sz="3600" b="1" dirty="0">
+                <a:solidFill>
+                  <a:srgbClr val="00426F"/>
+                </a:solidFill>
+                <a:latin typeface="Times New Roman" panose="02020603050405020304" pitchFamily="18" charset="0"/>
+                <a:cs typeface="Times New Roman" panose="02020603050405020304" pitchFamily="18" charset="0"/>
+              </a:rPr>
+              <a:t> </a:t>
+            </a:r>
+            <a:r>
+              <a:rPr lang="es-ES_tradnl" sz="3600" b="1" dirty="0" err="1">
+                <a:solidFill>
+                  <a:srgbClr val="00426F"/>
+                </a:solidFill>
+                <a:latin typeface="Times New Roman" panose="02020603050405020304" pitchFamily="18" charset="0"/>
+                <a:cs typeface="Times New Roman" panose="02020603050405020304" pitchFamily="18" charset="0"/>
+              </a:rPr>
+              <a:t>the</a:t>
+            </a:r>
+            <a:r>
+              <a:rPr lang="es-ES_tradnl" sz="3600" b="1" dirty="0">
+                <a:solidFill>
+                  <a:srgbClr val="00426F"/>
+                </a:solidFill>
+                <a:latin typeface="Times New Roman" panose="02020603050405020304" pitchFamily="18" charset="0"/>
+                <a:cs typeface="Times New Roman" panose="02020603050405020304" pitchFamily="18" charset="0"/>
+              </a:rPr>
+              <a:t> </a:t>
+            </a:r>
+            <a:r>
+              <a:rPr lang="es-ES_tradnl" sz="3600" b="1" dirty="0" err="1">
+                <a:solidFill>
+                  <a:srgbClr val="00426F"/>
+                </a:solidFill>
+                <a:latin typeface="Times New Roman" panose="02020603050405020304" pitchFamily="18" charset="0"/>
+                <a:cs typeface="Times New Roman" panose="02020603050405020304" pitchFamily="18" charset="0"/>
+              </a:rPr>
+              <a:t>problem</a:t>
             </a:r>
             <a:endParaRPr lang="es-ES_tradnl" sz="3600" dirty="0">
               <a:solidFill>
@@ -4048,11 +4182,96 @@
           </a:bodyPr>
           <a:lstStyle/>
           <a:p>
-            <a:pPr algn="just"/>
-            <a:r>
-              <a:rPr lang="es-ES_tradnl" sz="2400" dirty="0"/>
-              <a:t>En esta sección se realiza la descripción general del problema que se está abordando como parte del Trabajo de Obtención de Grado, incluyendo la definición del objetivo y su justificación. Adicionalmente, se pueden incluir brevemente los antecedentes, así como la novedad científica, tecnológica o la aportación del proyecto.</a:t>
-            </a:r>
+            <a:r>
+              <a:rPr lang="en-US" sz="2000" dirty="0"/>
+              <a:t>The problem to solve is recognition in high-resolution multi-spectral satellite imagery. To achieve this, we are going to use CNN. </a:t>
+            </a:r>
+          </a:p>
+          <a:p>
+            <a:r>
+              <a:rPr lang="en-US" sz="2000" dirty="0"/>
+              <a:t>The data base will be </a:t>
+            </a:r>
+            <a:r>
+              <a:rPr lang="en-US" sz="2000" dirty="0" err="1"/>
+              <a:t>fMoW</a:t>
+            </a:r>
+            <a:r>
+              <a:rPr lang="en-US" sz="2000" dirty="0"/>
+              <a:t> that is a data set that gathers information from many telescopes and classify the images in 62 classifications plus false detection. Reference [2] with nominal 0.5 meter per pixel and with more spectral bands as near IR plus the metadata. </a:t>
+            </a:r>
+          </a:p>
+          <a:p>
+            <a:r>
+              <a:rPr lang="en-US" sz="2000" dirty="0"/>
+              <a:t>The architecture that is going to be used is CNN plus a fully connected network. This doesn’t require any algorithm for feature detection. </a:t>
+            </a:r>
+            <a:endParaRPr lang="es-ES_tradnl" sz="2000" dirty="0"/>
+          </a:p>
+          <a:p>
+            <a:endParaRPr lang="en-US" sz="2000" dirty="0"/>
+          </a:p>
+          <a:p>
+            <a:r>
+              <a:rPr lang="es-MX" sz="2000" dirty="0" err="1"/>
+              <a:t>Complications</a:t>
+            </a:r>
+            <a:r>
+              <a:rPr lang="es-MX" sz="2000" dirty="0"/>
+              <a:t>: </a:t>
+            </a:r>
+          </a:p>
+          <a:p>
+            <a:r>
+              <a:rPr lang="en-US" sz="2000" dirty="0"/>
+              <a:t>C.1. One complication is that the satellite images are too big. Normally the images taken are small, otherwise it will take too long to process them. Example for </a:t>
+            </a:r>
+            <a:r>
+              <a:rPr lang="en-US" sz="2000" dirty="0" err="1"/>
+              <a:t>ResNet</a:t>
+            </a:r>
+            <a:r>
+              <a:rPr lang="en-US" sz="2000" dirty="0"/>
+              <a:t> and </a:t>
+            </a:r>
+            <a:r>
+              <a:rPr lang="en-US" sz="2000" dirty="0" err="1"/>
+              <a:t>DenseNet</a:t>
+            </a:r>
+            <a:r>
+              <a:rPr lang="en-US" sz="2000" dirty="0"/>
+              <a:t>: 224x224, Inception: 299x299. Normally the dataset (Images) are cropped to fit this size. Satellite images have thousands of pixels and the object to recognize also can have thousands of pixels then it is not useful to crop it. </a:t>
+            </a:r>
+          </a:p>
+          <a:p>
+            <a:r>
+              <a:rPr lang="en-US" sz="2000" dirty="0"/>
+              <a:t>C.2. Other complication is the orientation of the object, for example in an image of a person the head will be most of the time at the top and the feet at the bottom. </a:t>
+            </a:r>
+          </a:p>
+          <a:p>
+            <a:r>
+              <a:rPr lang="en-US" sz="2000" dirty="0"/>
+              <a:t>C.3. Another complication are the clouds. </a:t>
+            </a:r>
+          </a:p>
+          <a:p>
+            <a:r>
+              <a:rPr lang="es-MX" sz="2000" dirty="0"/>
+              <a:t>C.4. </a:t>
+            </a:r>
+            <a:r>
+              <a:rPr lang="es-MX" sz="2000" dirty="0" err="1"/>
+              <a:t>Datasets</a:t>
+            </a:r>
+            <a:r>
+              <a:rPr lang="es-MX" sz="2000" dirty="0"/>
+              <a:t>. </a:t>
+            </a:r>
+            <a:endParaRPr lang="es-ES_tradnl" sz="2000" dirty="0"/>
+          </a:p>
+          <a:p>
+            <a:endParaRPr lang="en-US" sz="2400" dirty="0"/>
           </a:p>
         </p:txBody>
       </p:sp>
@@ -4092,6 +4311,16 @@
           <a:p>
             <a:pPr algn="ctr"/>
             <a:r>
+              <a:rPr lang="es-ES_tradnl" sz="3600" b="1" dirty="0" err="1">
+                <a:solidFill>
+                  <a:srgbClr val="00426F"/>
+                </a:solidFill>
+                <a:latin typeface="Times New Roman" panose="02020603050405020304" pitchFamily="18" charset="0"/>
+                <a:cs typeface="Times New Roman" panose="02020603050405020304" pitchFamily="18" charset="0"/>
+              </a:rPr>
+              <a:t>Proposed</a:t>
+            </a:r>
+            <a:r>
               <a:rPr lang="es-ES_tradnl" sz="3600" b="1" dirty="0">
                 <a:solidFill>
                   <a:srgbClr val="00426F"/>
@@ -4099,7 +4328,17 @@
                 <a:latin typeface="Times New Roman" panose="02020603050405020304" pitchFamily="18" charset="0"/>
                 <a:cs typeface="Times New Roman" panose="02020603050405020304" pitchFamily="18" charset="0"/>
               </a:rPr>
-              <a:t>Modelo Propuesto</a:t>
+              <a:t> </a:t>
+            </a:r>
+            <a:r>
+              <a:rPr lang="es-ES_tradnl" sz="3600" b="1" dirty="0" err="1">
+                <a:solidFill>
+                  <a:srgbClr val="00426F"/>
+                </a:solidFill>
+                <a:latin typeface="Times New Roman" panose="02020603050405020304" pitchFamily="18" charset="0"/>
+                <a:cs typeface="Times New Roman" panose="02020603050405020304" pitchFamily="18" charset="0"/>
+              </a:rPr>
+              <a:t>Model</a:t>
             </a:r>
             <a:endParaRPr lang="es-ES_tradnl" sz="3600" dirty="0">
               <a:solidFill>
@@ -4167,11 +4406,18 @@
           </a:bodyPr>
           <a:lstStyle/>
           <a:p>
-            <a:pPr algn="just"/>
-            <a:r>
-              <a:rPr lang="es-ES_tradnl" sz="2400" dirty="0"/>
-              <a:t>En esta sección se detalla el modelo que se propone para la solución del problema que se describió en el apartado previo. Se puede incluir una breve revisión del estado del arte (sólo los trabajos más relevantes, que sirvan de parámetro para la validación de la propuesta).</a:t>
-            </a:r>
+            <a:r>
+              <a:rPr lang="en-US" sz="2400" dirty="0"/>
+              <a:t>The database was cropped and treated. Only the compacted RGB format will be used for this investigation</a:t>
+            </a:r>
+            <a:endParaRPr lang="es-MX" sz="2400" dirty="0"/>
+          </a:p>
+          <a:p>
+            <a:r>
+              <a:rPr lang="en-US" sz="2400" dirty="0"/>
+              <a:t>The architecture selected for this delivery was DenseNet-121 . This architecture in particular incorporate to the input of every filter the output of all the previous filters.</a:t>
+            </a:r>
+            <a:endParaRPr lang="es-MX" sz="2400" dirty="0"/>
           </a:p>
         </p:txBody>
       </p:sp>
@@ -4211,14 +4457,14 @@
           <a:p>
             <a:pPr algn="ctr"/>
             <a:r>
-              <a:rPr lang="es-ES_tradnl" sz="3600" b="1" dirty="0">
+              <a:rPr lang="es-ES_tradnl" sz="3600" b="1" dirty="0" err="1">
                 <a:solidFill>
                   <a:srgbClr val="00426F"/>
                 </a:solidFill>
                 <a:latin typeface="Times New Roman" panose="02020603050405020304" pitchFamily="18" charset="0"/>
                 <a:cs typeface="Times New Roman" panose="02020603050405020304" pitchFamily="18" charset="0"/>
               </a:rPr>
-              <a:t>Resultados Obtenidos</a:t>
+              <a:t>Results</a:t>
             </a:r>
             <a:endParaRPr lang="es-ES_tradnl" sz="3600" dirty="0">
               <a:solidFill>
@@ -4288,9 +4534,393 @@
           <a:p>
             <a:pPr algn="just"/>
             <a:r>
+              <a:rPr lang="es-ES_tradnl" sz="2400" dirty="0" err="1"/>
+              <a:t>The</a:t>
+            </a:r>
+            <a:r>
               <a:rPr lang="es-ES_tradnl" sz="2400" dirty="0"/>
-              <a:t>En esta sección se presentan los resultados que se han obtenido hasta el momento. Si el Trabajo de Obtención de Grado aún se encuentra en etapa de desarrollo, se pueden presentar los resultados preliminares o tentativos.</a:t>
-            </a:r>
+              <a:t> </a:t>
+            </a:r>
+            <a:r>
+              <a:rPr lang="es-ES_tradnl" sz="2400" dirty="0" err="1"/>
+              <a:t>first</a:t>
+            </a:r>
+            <a:r>
+              <a:rPr lang="es-ES_tradnl" sz="2400" dirty="0"/>
+              <a:t> step in </a:t>
+            </a:r>
+            <a:r>
+              <a:rPr lang="es-ES_tradnl" sz="2400" dirty="0" err="1"/>
+              <a:t>the</a:t>
+            </a:r>
+            <a:r>
+              <a:rPr lang="es-ES_tradnl" sz="2400" dirty="0"/>
+              <a:t> </a:t>
+            </a:r>
+            <a:r>
+              <a:rPr lang="es-ES_tradnl" sz="2400" dirty="0" err="1"/>
+              <a:t>image</a:t>
+            </a:r>
+            <a:r>
+              <a:rPr lang="es-ES_tradnl" sz="2400" dirty="0"/>
+              <a:t> </a:t>
+            </a:r>
+            <a:r>
+              <a:rPr lang="es-ES_tradnl" sz="2400" dirty="0" err="1"/>
+              <a:t>recognition</a:t>
+            </a:r>
+            <a:r>
+              <a:rPr lang="es-ES_tradnl" sz="2400" dirty="0"/>
+              <a:t> </a:t>
+            </a:r>
+            <a:r>
+              <a:rPr lang="es-ES_tradnl" sz="2400" dirty="0" err="1"/>
+              <a:t>model</a:t>
+            </a:r>
+            <a:r>
+              <a:rPr lang="es-ES_tradnl" sz="2400" dirty="0"/>
+              <a:t> </a:t>
+            </a:r>
+            <a:r>
+              <a:rPr lang="es-ES_tradnl" sz="2400" dirty="0" err="1"/>
+              <a:t>that</a:t>
+            </a:r>
+            <a:r>
+              <a:rPr lang="es-ES_tradnl" sz="2400" dirty="0"/>
+              <a:t> I am </a:t>
+            </a:r>
+            <a:r>
+              <a:rPr lang="es-ES_tradnl" sz="2400" dirty="0" err="1"/>
+              <a:t>proposing</a:t>
+            </a:r>
+            <a:r>
+              <a:rPr lang="es-ES_tradnl" sz="2400" dirty="0"/>
+              <a:t> </a:t>
+            </a:r>
+            <a:r>
+              <a:rPr lang="es-ES_tradnl" sz="2400" dirty="0" err="1"/>
+              <a:t>is</a:t>
+            </a:r>
+            <a:r>
+              <a:rPr lang="es-ES_tradnl" sz="2400" dirty="0"/>
+              <a:t> </a:t>
+            </a:r>
+            <a:r>
+              <a:rPr lang="es-ES_tradnl" sz="2400" dirty="0" err="1"/>
+              <a:t>to</a:t>
+            </a:r>
+            <a:r>
+              <a:rPr lang="es-ES_tradnl" sz="2400" dirty="0"/>
+              <a:t> </a:t>
+            </a:r>
+            <a:r>
+              <a:rPr lang="es-ES_tradnl" sz="2400" dirty="0" err="1"/>
+              <a:t>treate</a:t>
+            </a:r>
+            <a:r>
+              <a:rPr lang="es-ES_tradnl" sz="2400" dirty="0"/>
+              <a:t> </a:t>
+            </a:r>
+            <a:r>
+              <a:rPr lang="es-ES_tradnl" sz="2400" dirty="0" err="1"/>
+              <a:t>the</a:t>
+            </a:r>
+            <a:r>
+              <a:rPr lang="es-ES_tradnl" sz="2400" dirty="0"/>
+              <a:t> </a:t>
+            </a:r>
+            <a:r>
+              <a:rPr lang="es-ES_tradnl" sz="2400" dirty="0" err="1"/>
+              <a:t>images</a:t>
+            </a:r>
+            <a:r>
+              <a:rPr lang="es-ES_tradnl" sz="2400" dirty="0"/>
+              <a:t>. In </a:t>
+            </a:r>
+            <a:r>
+              <a:rPr lang="es-ES_tradnl" sz="2400" dirty="0" err="1"/>
+              <a:t>this</a:t>
+            </a:r>
+            <a:r>
+              <a:rPr lang="es-ES_tradnl" sz="2400" dirty="0"/>
+              <a:t> case </a:t>
+            </a:r>
+            <a:r>
+              <a:rPr lang="es-ES_tradnl" sz="2400" dirty="0" err="1"/>
+              <a:t>it</a:t>
+            </a:r>
+            <a:r>
+              <a:rPr lang="es-ES_tradnl" sz="2400" dirty="0"/>
+              <a:t> </a:t>
+            </a:r>
+            <a:r>
+              <a:rPr lang="es-ES_tradnl" sz="2400" dirty="0" err="1"/>
+              <a:t>is</a:t>
+            </a:r>
+            <a:r>
+              <a:rPr lang="es-ES_tradnl" sz="2400" dirty="0"/>
+              <a:t> </a:t>
+            </a:r>
+            <a:r>
+              <a:rPr lang="es-ES_tradnl" sz="2400" dirty="0" err="1"/>
+              <a:t>required</a:t>
+            </a:r>
+            <a:r>
+              <a:rPr lang="es-ES_tradnl" sz="2400" dirty="0"/>
+              <a:t> </a:t>
+            </a:r>
+            <a:r>
+              <a:rPr lang="es-ES_tradnl" sz="2400" dirty="0" err="1"/>
+              <a:t>to</a:t>
+            </a:r>
+            <a:r>
+              <a:rPr lang="es-ES_tradnl" sz="2400" dirty="0"/>
+              <a:t> </a:t>
+            </a:r>
+            <a:r>
+              <a:rPr lang="es-ES_tradnl" sz="2400" dirty="0" err="1"/>
+              <a:t>work</a:t>
+            </a:r>
+            <a:r>
+              <a:rPr lang="es-ES_tradnl" sz="2400" dirty="0"/>
+              <a:t> </a:t>
+            </a:r>
+            <a:r>
+              <a:rPr lang="es-ES_tradnl" sz="2400" dirty="0" err="1"/>
+              <a:t>only</a:t>
+            </a:r>
+            <a:r>
+              <a:rPr lang="es-ES_tradnl" sz="2400" dirty="0"/>
+              <a:t> </a:t>
+            </a:r>
+            <a:r>
+              <a:rPr lang="es-ES_tradnl" sz="2400" dirty="0" err="1"/>
+              <a:t>withthe</a:t>
+            </a:r>
+            <a:r>
+              <a:rPr lang="es-ES_tradnl" sz="2400" dirty="0"/>
+              <a:t> </a:t>
+            </a:r>
+            <a:r>
+              <a:rPr lang="es-ES_tradnl" sz="2400" dirty="0" err="1"/>
+              <a:t>compacted</a:t>
+            </a:r>
+            <a:r>
+              <a:rPr lang="es-ES_tradnl" sz="2400" dirty="0"/>
+              <a:t> RGB </a:t>
+            </a:r>
+            <a:r>
+              <a:rPr lang="es-ES_tradnl" sz="2400" dirty="0" err="1"/>
+              <a:t>format</a:t>
+            </a:r>
+            <a:r>
+              <a:rPr lang="es-ES_tradnl" sz="2400" dirty="0"/>
+              <a:t> </a:t>
+            </a:r>
+            <a:r>
+              <a:rPr lang="es-ES_tradnl" sz="2400" dirty="0" err="1"/>
+              <a:t>of</a:t>
+            </a:r>
+            <a:r>
+              <a:rPr lang="es-ES_tradnl" sz="2400" dirty="0"/>
+              <a:t> </a:t>
+            </a:r>
+            <a:r>
+              <a:rPr lang="es-ES_tradnl" sz="2400" dirty="0" err="1"/>
+              <a:t>the</a:t>
+            </a:r>
+            <a:r>
+              <a:rPr lang="es-ES_tradnl" sz="2400" dirty="0"/>
+              <a:t> data base and </a:t>
+            </a:r>
+            <a:r>
+              <a:rPr lang="es-ES_tradnl" sz="2400" dirty="0" err="1"/>
+              <a:t>crop</a:t>
+            </a:r>
+            <a:r>
+              <a:rPr lang="es-ES_tradnl" sz="2400" dirty="0"/>
+              <a:t> </a:t>
+            </a:r>
+            <a:r>
+              <a:rPr lang="es-ES_tradnl" sz="2400" dirty="0" err="1"/>
+              <a:t>it</a:t>
+            </a:r>
+            <a:r>
+              <a:rPr lang="es-ES_tradnl" sz="2400" dirty="0"/>
+              <a:t> </a:t>
+            </a:r>
+            <a:r>
+              <a:rPr lang="es-ES_tradnl" sz="2400" dirty="0" err="1"/>
+              <a:t>to</a:t>
+            </a:r>
+            <a:r>
+              <a:rPr lang="es-ES_tradnl" sz="2400" dirty="0"/>
+              <a:t> </a:t>
+            </a:r>
+            <a:r>
+              <a:rPr lang="es-ES_tradnl" sz="2400" dirty="0" err="1"/>
+              <a:t>get</a:t>
+            </a:r>
+            <a:r>
+              <a:rPr lang="es-ES_tradnl" sz="2400" dirty="0"/>
+              <a:t> </a:t>
+            </a:r>
+            <a:r>
+              <a:rPr lang="es-ES_tradnl" sz="2400" dirty="0" err="1"/>
+              <a:t>the</a:t>
+            </a:r>
+            <a:r>
+              <a:rPr lang="es-ES_tradnl" sz="2400" dirty="0"/>
+              <a:t> </a:t>
+            </a:r>
+            <a:r>
+              <a:rPr lang="es-ES_tradnl" sz="2400" dirty="0" err="1"/>
+              <a:t>size</a:t>
+            </a:r>
+            <a:r>
+              <a:rPr lang="es-ES_tradnl" sz="2400" dirty="0"/>
+              <a:t> 224x224. As </a:t>
+            </a:r>
+            <a:r>
+              <a:rPr lang="es-ES_tradnl" sz="2400" dirty="0" err="1"/>
+              <a:t>proposed</a:t>
+            </a:r>
+            <a:r>
+              <a:rPr lang="es-ES_tradnl" sz="2400" dirty="0"/>
+              <a:t> in [1] </a:t>
+            </a:r>
+            <a:r>
+              <a:rPr lang="es-ES_tradnl" sz="2400" dirty="0" err="1"/>
+              <a:t>one</a:t>
+            </a:r>
+            <a:r>
+              <a:rPr lang="es-ES_tradnl" sz="2400" dirty="0"/>
+              <a:t> </a:t>
+            </a:r>
+            <a:r>
+              <a:rPr lang="es-ES_tradnl" sz="2400" dirty="0" err="1"/>
+              <a:t>way</a:t>
+            </a:r>
+            <a:r>
+              <a:rPr lang="es-ES_tradnl" sz="2400" dirty="0"/>
+              <a:t> </a:t>
+            </a:r>
+            <a:r>
+              <a:rPr lang="es-ES_tradnl" sz="2400" dirty="0" err="1"/>
+              <a:t>to</a:t>
+            </a:r>
+            <a:r>
+              <a:rPr lang="es-ES_tradnl" sz="2400" dirty="0"/>
+              <a:t> reduce </a:t>
+            </a:r>
+            <a:r>
+              <a:rPr lang="es-ES_tradnl" sz="2400" dirty="0" err="1"/>
+              <a:t>the</a:t>
+            </a:r>
+            <a:r>
+              <a:rPr lang="es-ES_tradnl" sz="2400" dirty="0"/>
+              <a:t> </a:t>
+            </a:r>
+            <a:r>
+              <a:rPr lang="es-ES_tradnl" sz="2400" dirty="0" err="1"/>
+              <a:t>complication</a:t>
+            </a:r>
+            <a:r>
+              <a:rPr lang="es-ES_tradnl" sz="2400" dirty="0"/>
+              <a:t> C.2 </a:t>
+            </a:r>
+            <a:r>
+              <a:rPr lang="es-ES_tradnl" sz="2400" dirty="0" err="1"/>
+              <a:t>is</a:t>
+            </a:r>
+            <a:r>
+              <a:rPr lang="es-ES_tradnl" sz="2400" dirty="0"/>
+              <a:t> </a:t>
+            </a:r>
+            <a:r>
+              <a:rPr lang="es-ES_tradnl" sz="2400" dirty="0" err="1"/>
+              <a:t>turning</a:t>
+            </a:r>
+            <a:r>
+              <a:rPr lang="es-ES_tradnl" sz="2400" dirty="0"/>
+              <a:t> and </a:t>
+            </a:r>
+            <a:r>
+              <a:rPr lang="es-ES_tradnl" sz="2400" dirty="0" err="1"/>
+              <a:t>flipping</a:t>
+            </a:r>
+            <a:r>
+              <a:rPr lang="es-ES_tradnl" sz="2400" dirty="0"/>
+              <a:t> </a:t>
+            </a:r>
+            <a:r>
+              <a:rPr lang="es-ES_tradnl" sz="2400" dirty="0" err="1"/>
+              <a:t>the</a:t>
+            </a:r>
+            <a:r>
+              <a:rPr lang="es-ES_tradnl" sz="2400" dirty="0"/>
+              <a:t> </a:t>
+            </a:r>
+            <a:r>
+              <a:rPr lang="es-ES_tradnl" sz="2400" dirty="0" err="1"/>
+              <a:t>images</a:t>
+            </a:r>
+            <a:r>
+              <a:rPr lang="es-ES_tradnl" sz="2400" dirty="0"/>
+              <a:t>, </a:t>
+            </a:r>
+            <a:r>
+              <a:rPr lang="es-ES_tradnl" sz="2400" dirty="0" err="1"/>
+              <a:t>this</a:t>
+            </a:r>
+            <a:r>
+              <a:rPr lang="es-ES_tradnl" sz="2400" dirty="0"/>
+              <a:t> Will </a:t>
+            </a:r>
+            <a:r>
+              <a:rPr lang="es-ES_tradnl" sz="2400" dirty="0" err="1"/>
+              <a:t>make</a:t>
+            </a:r>
+            <a:r>
+              <a:rPr lang="es-ES_tradnl" sz="2400" dirty="0"/>
+              <a:t> </a:t>
+            </a:r>
+            <a:r>
+              <a:rPr lang="es-ES_tradnl" sz="2400" dirty="0" err="1"/>
+              <a:t>our</a:t>
+            </a:r>
+            <a:r>
+              <a:rPr lang="es-ES_tradnl" sz="2400" dirty="0"/>
+              <a:t> </a:t>
+            </a:r>
+            <a:r>
+              <a:rPr lang="es-ES_tradnl" sz="2400" dirty="0" err="1"/>
+              <a:t>database</a:t>
+            </a:r>
+            <a:r>
+              <a:rPr lang="es-ES_tradnl" sz="2400" dirty="0"/>
+              <a:t> </a:t>
+            </a:r>
+            <a:r>
+              <a:rPr lang="es-ES_tradnl" sz="2400" dirty="0" err="1"/>
+              <a:t>larger</a:t>
+            </a:r>
+            <a:r>
+              <a:rPr lang="es-ES_tradnl" sz="2400" dirty="0"/>
+              <a:t> and </a:t>
+            </a:r>
+            <a:r>
+              <a:rPr lang="es-ES_tradnl" sz="2400" dirty="0" err="1"/>
+              <a:t>robust</a:t>
+            </a:r>
+            <a:r>
+              <a:rPr lang="es-ES_tradnl" sz="2400" dirty="0"/>
+              <a:t>.</a:t>
+            </a:r>
+          </a:p>
+          <a:p>
+            <a:pPr algn="just"/>
+            <a:endParaRPr lang="es-ES_tradnl" sz="2400" dirty="0"/>
           </a:p>
         </p:txBody>
       </p:sp>
@@ -4330,14 +4960,14 @@
           <a:p>
             <a:pPr algn="ctr"/>
             <a:r>
-              <a:rPr lang="es-ES_tradnl" sz="3600" b="1" dirty="0">
+              <a:rPr lang="es-ES_tradnl" sz="3600" b="1" dirty="0" err="1">
                 <a:solidFill>
                   <a:srgbClr val="00426F"/>
                 </a:solidFill>
                 <a:latin typeface="Times New Roman" panose="02020603050405020304" pitchFamily="18" charset="0"/>
                 <a:cs typeface="Times New Roman" panose="02020603050405020304" pitchFamily="18" charset="0"/>
               </a:rPr>
-              <a:t>Conclusiones</a:t>
+              <a:t>Coclusions</a:t>
             </a:r>
             <a:endParaRPr lang="es-ES_tradnl" sz="3600" dirty="0">
               <a:solidFill>
@@ -4364,7 +4994,7 @@
         <p:spPr>
           <a:xfrm>
             <a:off x="11169943" y="19124561"/>
-            <a:ext cx="10080000" cy="3600000"/>
+            <a:ext cx="10080000" cy="3595739"/>
           </a:xfrm>
           <a:prstGeom prst="rect">
             <a:avLst/>
@@ -4405,11 +5035,19 @@
           </a:bodyPr>
           <a:lstStyle/>
           <a:p>
-            <a:pPr algn="just"/>
-            <a:r>
-              <a:rPr lang="es-ES_tradnl" sz="2400" dirty="0"/>
-              <a:t>En esta sección se presentan las conclusiones a las que se ha llegado con los resultados que se han obtenido, así como el porcentaje de avance respecto al alcance y objetivo del Trabajo de Obtención de Grado.</a:t>
-            </a:r>
+            <a:r>
+              <a:rPr lang="en-US" sz="2400" dirty="0"/>
+              <a:t>The database is a millstone when we are working with </a:t>
+            </a:r>
+            <a:r>
+              <a:rPr lang="en-US" sz="2400" dirty="0" err="1"/>
+              <a:t>DeepLearning</a:t>
+            </a:r>
+            <a:r>
+              <a:rPr lang="en-US" sz="2400" dirty="0"/>
+              <a:t>. First of all it has to be well classified but after that it has to be treated because a wrong treatment will impact directly in time or/and computer processing.</a:t>
+            </a:r>
+            <a:endParaRPr lang="es-MX" sz="2400" dirty="0"/>
           </a:p>
           <a:p>
             <a:pPr algn="just"/>
@@ -4453,14 +5091,14 @@
           <a:p>
             <a:pPr algn="ctr"/>
             <a:r>
-              <a:rPr lang="es-ES_tradnl" sz="3600" b="1" dirty="0">
+              <a:rPr lang="es-ES_tradnl" sz="3600" dirty="0" err="1">
                 <a:solidFill>
                   <a:srgbClr val="00426F"/>
                 </a:solidFill>
                 <a:latin typeface="Times New Roman" panose="02020603050405020304" pitchFamily="18" charset="0"/>
                 <a:cs typeface="Times New Roman" panose="02020603050405020304" pitchFamily="18" charset="0"/>
               </a:rPr>
-              <a:t>Referencias Significativas</a:t>
+              <a:t>References</a:t>
             </a:r>
             <a:endParaRPr lang="es-ES_tradnl" sz="3600" dirty="0">
               <a:solidFill>
@@ -4528,153 +5166,401 @@
           </a:bodyPr>
           <a:lstStyle/>
           <a:p>
-            <a:pPr algn="just"/>
-            <a:r>
-              <a:rPr lang="es-ES_tradnl" sz="2000" dirty="0"/>
-              <a:t>En esta sección se deben incluir las referencias bibliográficas que sean más representativas en formato IEEE, como ejemplo:</a:t>
-            </a:r>
-          </a:p>
-          <a:p>
-            <a:pPr algn="just"/>
-            <a:r>
-              <a:rPr lang="es-ES_tradnl" sz="2000" dirty="0"/>
-              <a:t>[1] K. A. Nelson, R. J. Davis, D. R. </a:t>
-            </a:r>
-            <a:r>
-              <a:rPr lang="es-ES_tradnl" sz="2000" dirty="0" err="1"/>
-              <a:t>Lutz</a:t>
-            </a:r>
-            <a:r>
-              <a:rPr lang="es-ES_tradnl" sz="2000" dirty="0"/>
-              <a:t>, and W. Smith, “</a:t>
-            </a:r>
-            <a:r>
-              <a:rPr lang="es-ES_tradnl" sz="2000" dirty="0" err="1"/>
-              <a:t>Optical</a:t>
-            </a:r>
-            <a:r>
-              <a:rPr lang="es-ES_tradnl" sz="2000" dirty="0"/>
+            <a:r>
+              <a:rPr lang="en-US" sz="800" i="1" dirty="0"/>
+              <a:t>[2] “Earth on AWS: Functional Map of the World,” Amazon.com, https://aws.amazon.com/earth/. </a:t>
+            </a:r>
+          </a:p>
+          <a:p>
+            <a:r>
+              <a:rPr lang="en-US" sz="800" i="1" dirty="0"/>
+              <a:t>[1] Mark Pritt, and Gary </a:t>
+            </a:r>
+            <a:r>
+              <a:rPr lang="en-US" sz="800" i="1" dirty="0" err="1"/>
+              <a:t>Chern</a:t>
+            </a:r>
+            <a:r>
+              <a:rPr lang="en-US" sz="800" i="1" dirty="0"/>
+              <a:t> “Satellite Image Classification with Deep Learning” IEEE 978-1-5386-1235-4/17/$31.00 2017 </a:t>
+            </a:r>
+          </a:p>
+          <a:p>
+            <a:r>
+              <a:rPr lang="fr-FR" sz="800" i="1" dirty="0"/>
+              <a:t>[3] “Applications”, </a:t>
+            </a:r>
+            <a:r>
+              <a:rPr lang="fr-FR" sz="800" i="1" dirty="0" err="1"/>
+              <a:t>Keras</a:t>
+            </a:r>
+            <a:r>
+              <a:rPr lang="fr-FR" sz="800" i="1" dirty="0"/>
+              <a:t>, https://keras.io/applications/. </a:t>
+            </a:r>
+          </a:p>
+          <a:p>
+            <a:r>
+              <a:rPr lang="es-MX" sz="800" i="1" dirty="0"/>
+              <a:t>[4] F. </a:t>
+            </a:r>
+            <a:r>
+              <a:rPr lang="es-MX" sz="800" i="1" dirty="0" err="1"/>
+              <a:t>Yu</a:t>
+            </a:r>
+            <a:r>
+              <a:rPr lang="es-MX" sz="800" i="1" dirty="0"/>
+              <a:t>, “CNN </a:t>
+            </a:r>
+            <a:r>
+              <a:rPr lang="es-MX" sz="800" i="1" dirty="0" err="1"/>
+              <a:t>Finetune</a:t>
+            </a:r>
+            <a:r>
+              <a:rPr lang="es-MX" sz="800" i="1" dirty="0"/>
+              <a:t>”, </a:t>
+            </a:r>
+            <a:r>
+              <a:rPr lang="es-MX" sz="800" i="1" dirty="0" err="1"/>
+              <a:t>Github</a:t>
+            </a:r>
+            <a:r>
+              <a:rPr lang="es-MX" sz="800" i="1" dirty="0"/>
+              <a:t>, 2017, https://github.com/flyyufelix/ </a:t>
+            </a:r>
+            <a:r>
+              <a:rPr lang="es-MX" sz="800" i="1" dirty="0" err="1"/>
+              <a:t>cnn_finetune</a:t>
+            </a:r>
+            <a:r>
+              <a:rPr lang="es-MX" sz="800" i="1" dirty="0"/>
+              <a:t>. </a:t>
+            </a:r>
+          </a:p>
+          <a:p>
+            <a:r>
+              <a:rPr lang="en-US" sz="800" i="1" dirty="0"/>
+              <a:t>[5] C. </a:t>
+            </a:r>
+            <a:r>
+              <a:rPr lang="en-US" sz="800" i="1" dirty="0" err="1"/>
+              <a:t>Szegedy</a:t>
+            </a:r>
+            <a:r>
+              <a:rPr lang="en-US" sz="800" i="1" dirty="0"/>
+              <a:t> et al., “Rethinking the Inception Architecture for Computer Vision,” IEEE Computer Society Conference on Computer Vision and Pattern Recognition (CVPR), 2015. </a:t>
+            </a:r>
+          </a:p>
+          <a:p>
+            <a:r>
+              <a:rPr lang="en-US" sz="800" i="1" dirty="0"/>
+              <a:t>[6] K. He et al., “Deep residual learning for image recognition,” </a:t>
+            </a:r>
+            <a:r>
+              <a:rPr lang="en-US" sz="800" i="1" dirty="0" err="1"/>
+              <a:t>arXiv</a:t>
+            </a:r>
+            <a:r>
+              <a:rPr lang="en-US" sz="800" i="1" dirty="0"/>
+              <a:t> 1512.03385, Dec 2015. </a:t>
+            </a:r>
+          </a:p>
+          <a:p>
+            <a:r>
+              <a:rPr lang="en-US" sz="800" i="1" dirty="0"/>
+              <a:t>[7] G. Huang, “Dense connected convolutional neural networks,” IEEE Computer Society Conference on Computer Vision and Pattern Recognition (CVPR), 2017. </a:t>
+            </a:r>
+          </a:p>
+          <a:p>
+            <a:r>
+              <a:rPr lang="en-US" sz="800" i="1" dirty="0"/>
+              <a:t>[8] F. </a:t>
+            </a:r>
+            <a:r>
+              <a:rPr lang="en-US" sz="800" i="1" dirty="0" err="1"/>
+              <a:t>Chollet</a:t>
+            </a:r>
+            <a:r>
+              <a:rPr lang="en-US" sz="800" i="1" dirty="0"/>
+              <a:t>, “</a:t>
+            </a:r>
+            <a:r>
+              <a:rPr lang="en-US" sz="800" i="1" dirty="0" err="1"/>
+              <a:t>Xception</a:t>
+            </a:r>
+            <a:r>
+              <a:rPr lang="en-US" sz="800" i="1" dirty="0"/>
+              <a:t>: deep learning with </a:t>
+            </a:r>
+            <a:r>
+              <a:rPr lang="en-US" sz="800" i="1" dirty="0" err="1"/>
+              <a:t>depthwise</a:t>
+            </a:r>
+            <a:r>
+              <a:rPr lang="en-US" sz="800" i="1" dirty="0"/>
+              <a:t> separable convolutions,” </a:t>
+            </a:r>
+            <a:r>
+              <a:rPr lang="en-US" sz="800" i="1" dirty="0" err="1"/>
+              <a:t>arXiv</a:t>
+            </a:r>
+            <a:r>
+              <a:rPr lang="en-US" sz="800" i="1" dirty="0"/>
+              <a:t> 1610.02357, Oct 2016. </a:t>
+            </a:r>
+          </a:p>
+          <a:p>
+            <a:r>
+              <a:rPr lang="en-US" sz="800" i="1" dirty="0"/>
+              <a:t>[9] Y. Liang, S. Monteiro, and E. Saber, “Transfer learning for high-resolution aerial image classification,” IEEE Workshop Applied Imagery Pattern Recognition (AIPR), Oct 2016. </a:t>
+            </a:r>
+          </a:p>
+          <a:p>
+            <a:r>
+              <a:rPr lang="en-US" sz="800" i="1" dirty="0"/>
+              <a:t>[10] M. </a:t>
+            </a:r>
+            <a:r>
+              <a:rPr lang="en-US" sz="800" i="1" dirty="0" err="1"/>
+              <a:t>Castelluccio</a:t>
+            </a:r>
+            <a:r>
+              <a:rPr lang="en-US" sz="800" i="1" dirty="0"/>
+              <a:t>, G. Poggi, and L. </a:t>
+            </a:r>
+            <a:r>
+              <a:rPr lang="en-US" sz="800" i="1" dirty="0" err="1"/>
+              <a:t>Verdoliva</a:t>
+            </a:r>
+            <a:r>
+              <a:rPr lang="en-US" sz="800" i="1" dirty="0"/>
+              <a:t>, “Land Use Classification in Remote Sensing Images by Convolutional Neural Networks,” </a:t>
+            </a:r>
+            <a:r>
+              <a:rPr lang="en-US" sz="800" i="1" dirty="0" err="1"/>
+              <a:t>arXiv</a:t>
+            </a:r>
+            <a:r>
+              <a:rPr lang="en-US" sz="800" i="1" dirty="0"/>
+              <a:t> 1508.00092, Aug 2015. </a:t>
+            </a:r>
+          </a:p>
+          <a:p>
+            <a:r>
+              <a:rPr lang="en-US" sz="800" i="1" dirty="0"/>
+              <a:t>[11] G. Scott, M. England, W. </a:t>
+            </a:r>
+            <a:r>
+              <a:rPr lang="en-US" sz="800" i="1" dirty="0" err="1"/>
+              <a:t>Starms</a:t>
+            </a:r>
+            <a:r>
+              <a:rPr lang="en-US" sz="800" i="1" dirty="0"/>
+              <a:t>, R. Marcum, and C. Davis, “Training deep convolutional neural networks for land–cover classification of high-resolution imagery”, IEEE Geoscience and Remote Sensing Letters, vol. 14, no. 4, pp. 549-553, Apr 2017. </a:t>
+            </a:r>
+          </a:p>
+          <a:p>
+            <a:r>
+              <a:rPr lang="es-MX" sz="800" i="1" dirty="0"/>
+              <a:t>[12] A. </a:t>
+            </a:r>
+            <a:r>
+              <a:rPr lang="es-MX" sz="800" i="1" dirty="0" err="1"/>
+              <a:t>Razavian</a:t>
+            </a:r>
+            <a:r>
+              <a:rPr lang="es-MX" sz="800" i="1" dirty="0"/>
+              <a:t>, H. </a:t>
+            </a:r>
+            <a:r>
+              <a:rPr lang="es-MX" sz="800" i="1" dirty="0" err="1"/>
+              <a:t>Azizpour</a:t>
+            </a:r>
+            <a:r>
+              <a:rPr lang="es-MX" sz="800" i="1" dirty="0"/>
+              <a:t>, J. Sullivan, and S. </a:t>
+            </a:r>
+            <a:r>
+              <a:rPr lang="es-MX" sz="800" i="1" dirty="0" err="1"/>
+              <a:t>Carlsson</a:t>
+            </a:r>
+            <a:r>
+              <a:rPr lang="es-MX" sz="800" i="1" dirty="0"/>
+              <a:t>, “CNN </a:t>
+            </a:r>
+            <a:r>
+              <a:rPr lang="es-MX" sz="800" i="1" dirty="0" err="1"/>
+              <a:t>features</a:t>
+            </a:r>
+            <a:r>
+              <a:rPr lang="es-MX" sz="800" i="1" dirty="0"/>
+              <a:t> off-</a:t>
+            </a:r>
+            <a:r>
+              <a:rPr lang="es-MX" sz="800" i="1" dirty="0" err="1"/>
+              <a:t>the</a:t>
+            </a:r>
+            <a:r>
+              <a:rPr lang="es-MX" sz="800" i="1" dirty="0"/>
+              <a:t>-</a:t>
+            </a:r>
+            <a:r>
+              <a:rPr lang="es-MX" sz="800" i="1" dirty="0" err="1"/>
+              <a:t>shelf</a:t>
+            </a:r>
+            <a:r>
+              <a:rPr lang="es-MX" sz="800" i="1" dirty="0"/>
+              <a:t>: </a:t>
+            </a:r>
+            <a:r>
+              <a:rPr lang="es-MX" sz="800" i="1" dirty="0" err="1"/>
+              <a:t>an</a:t>
+            </a:r>
+            <a:r>
+              <a:rPr lang="es-MX" sz="800" i="1" dirty="0"/>
               <a:t> </a:t>
             </a:r>
             <a:r>
-              <a:rPr lang="es-ES_tradnl" sz="2000" dirty="0" err="1"/>
-              <a:t>generation</a:t>
-            </a:r>
-            <a:r>
-              <a:rPr lang="es-ES_tradnl" sz="2000" dirty="0"/>
-              <a:t> of </a:t>
-            </a:r>
-            <a:r>
-              <a:rPr lang="es-ES_tradnl" sz="2000" dirty="0" err="1"/>
-              <a:t>tunable</a:t>
-            </a:r>
-            <a:r>
-              <a:rPr lang="es-ES_tradnl" sz="2000" dirty="0"/>
+              <a:rPr lang="es-MX" sz="800" i="1" dirty="0" err="1"/>
+              <a:t>astounding</a:t>
+            </a:r>
+            <a:r>
+              <a:rPr lang="es-MX" sz="800" i="1" dirty="0"/>
               <a:t> </a:t>
             </a:r>
             <a:r>
-              <a:rPr lang="es-ES_tradnl" sz="2000" dirty="0" err="1"/>
-              <a:t>ultrasonic</a:t>
-            </a:r>
-            <a:r>
-              <a:rPr lang="es-ES_tradnl" sz="2000" dirty="0"/>
+              <a:rPr lang="es-MX" sz="800" i="1" dirty="0" err="1"/>
+              <a:t>baseline</a:t>
+            </a:r>
+            <a:r>
+              <a:rPr lang="es-MX" sz="800" i="1" dirty="0"/>
               <a:t> </a:t>
             </a:r>
             <a:r>
-              <a:rPr lang="es-ES_tradnl" sz="2000" dirty="0" err="1"/>
-              <a:t>waves</a:t>
-            </a:r>
-            <a:r>
-              <a:rPr lang="es-ES_tradnl" sz="2000" dirty="0"/>
-              <a:t>,” </a:t>
-            </a:r>
-            <a:r>
-              <a:rPr lang="es-ES_tradnl" sz="2000" dirty="0" err="1"/>
-              <a:t>Journal</a:t>
-            </a:r>
-            <a:r>
-              <a:rPr lang="es-ES_tradnl" sz="2000" dirty="0"/>
-              <a:t> of </a:t>
-            </a:r>
-            <a:r>
-              <a:rPr lang="es-ES_tradnl" sz="2000" dirty="0" err="1"/>
-              <a:t>Applied</a:t>
-            </a:r>
-            <a:r>
-              <a:rPr lang="es-ES_tradnl" sz="2000" dirty="0"/>
+              <a:rPr lang="es-MX" sz="800" i="1" dirty="0" err="1"/>
+              <a:t>for</a:t>
+            </a:r>
+            <a:r>
+              <a:rPr lang="es-MX" sz="800" i="1" dirty="0"/>
               <a:t> </a:t>
             </a:r>
             <a:r>
-              <a:rPr lang="es-ES_tradnl" sz="2000" dirty="0" err="1"/>
-              <a:t>Physics</a:t>
-            </a:r>
-            <a:r>
-              <a:rPr lang="es-ES_tradnl" sz="2000" dirty="0"/>
-              <a:t>, vol. 53, no. 2, Feb., pp. 1144-1149, 2002.</a:t>
-            </a:r>
-          </a:p>
-          <a:p>
-            <a:pPr algn="just"/>
-            <a:r>
-              <a:rPr lang="es-ES_tradnl" sz="2000" dirty="0"/>
-              <a:t>[2] J. L. </a:t>
-            </a:r>
-            <a:r>
-              <a:rPr lang="es-ES_tradnl" sz="2000" dirty="0" err="1"/>
-              <a:t>Spudich</a:t>
-            </a:r>
-            <a:r>
-              <a:rPr lang="es-ES_tradnl" sz="2000" dirty="0"/>
-              <a:t> and B. H. </a:t>
-            </a:r>
-            <a:r>
-              <a:rPr lang="es-ES_tradnl" sz="2000" dirty="0" err="1"/>
-              <a:t>Satir</a:t>
-            </a:r>
-            <a:r>
-              <a:rPr lang="es-ES_tradnl" sz="2000" dirty="0"/>
-              <a:t>, Eds., </a:t>
-            </a:r>
-            <a:r>
-              <a:rPr lang="es-ES_tradnl" sz="2000" dirty="0" err="1"/>
-              <a:t>Sensory</a:t>
-            </a:r>
-            <a:r>
-              <a:rPr lang="es-ES_tradnl" sz="2000" dirty="0"/>
+              <a:rPr lang="es-MX" sz="800" i="1" dirty="0" err="1"/>
+              <a:t>recognition</a:t>
+            </a:r>
+            <a:r>
+              <a:rPr lang="es-MX" sz="800" i="1" dirty="0"/>
+              <a:t>,” IEEE </a:t>
+            </a:r>
+            <a:r>
+              <a:rPr lang="es-MX" sz="800" i="1" dirty="0" err="1"/>
+              <a:t>Computer</a:t>
+            </a:r>
+            <a:r>
+              <a:rPr lang="es-MX" sz="800" i="1" dirty="0"/>
               <a:t> </a:t>
             </a:r>
             <a:r>
-              <a:rPr lang="es-ES_tradnl" sz="2000" dirty="0" err="1"/>
-              <a:t>Receptors</a:t>
-            </a:r>
-            <a:r>
-              <a:rPr lang="es-ES_tradnl" sz="2000" dirty="0"/>
+              <a:rPr lang="es-MX" sz="800" i="1" dirty="0" err="1"/>
+              <a:t>Society</a:t>
+            </a:r>
+            <a:r>
+              <a:rPr lang="es-MX" sz="800" i="1" dirty="0"/>
+              <a:t> </a:t>
+            </a:r>
+            <a:r>
+              <a:rPr lang="es-MX" sz="800" i="1" dirty="0" err="1"/>
+              <a:t>Conference</a:t>
+            </a:r>
+            <a:r>
+              <a:rPr lang="es-MX" sz="800" i="1" dirty="0"/>
+              <a:t> </a:t>
+            </a:r>
+            <a:r>
+              <a:rPr lang="es-MX" sz="800" i="1" dirty="0" err="1"/>
+              <a:t>on</a:t>
+            </a:r>
+            <a:r>
+              <a:rPr lang="es-MX" sz="800" i="1" dirty="0"/>
+              <a:t> </a:t>
+            </a:r>
+            <a:r>
+              <a:rPr lang="es-MX" sz="800" i="1" dirty="0" err="1"/>
+              <a:t>Computer</a:t>
+            </a:r>
+            <a:r>
+              <a:rPr lang="es-MX" sz="800" i="1" dirty="0"/>
+              <a:t> </a:t>
+            </a:r>
+            <a:r>
+              <a:rPr lang="es-MX" sz="800" i="1" dirty="0" err="1"/>
+              <a:t>Vision</a:t>
+            </a:r>
+            <a:r>
+              <a:rPr lang="es-MX" sz="800" i="1" dirty="0"/>
               <a:t> and </a:t>
             </a:r>
             <a:r>
-              <a:rPr lang="es-ES_tradnl" sz="2000" dirty="0" err="1"/>
-              <a:t>Signal</a:t>
-            </a:r>
-            <a:r>
-              <a:rPr lang="es-ES_tradnl" sz="2000" dirty="0"/>
+              <a:rPr lang="es-MX" sz="800" i="1" dirty="0" err="1"/>
+              <a:t>Pattern</a:t>
+            </a:r>
+            <a:r>
+              <a:rPr lang="es-MX" sz="800" i="1" dirty="0"/>
               <a:t> </a:t>
             </a:r>
             <a:r>
-              <a:rPr lang="es-ES_tradnl" sz="2000" dirty="0" err="1"/>
-              <a:t>Transduction</a:t>
-            </a:r>
-            <a:r>
-              <a:rPr lang="es-ES_tradnl" sz="2000" dirty="0"/>
-              <a:t>. New York: </a:t>
-            </a:r>
-            <a:r>
-              <a:rPr lang="es-ES_tradnl" sz="2000" dirty="0" err="1"/>
-              <a:t>Wiley-Liss</a:t>
-            </a:r>
-            <a:r>
-              <a:rPr lang="es-ES_tradnl" sz="2000" dirty="0"/>
-              <a:t>, 2001.</a:t>
-            </a:r>
+              <a:rPr lang="es-MX" sz="800" i="1" dirty="0" err="1"/>
+              <a:t>Recognition</a:t>
+            </a:r>
+            <a:r>
+              <a:rPr lang="es-MX" sz="800" i="1" dirty="0"/>
+              <a:t> (CVPR), pp. 512-519, 2014. </a:t>
+            </a:r>
+          </a:p>
+          <a:p>
+            <a:r>
+              <a:rPr lang="en-US" sz="800" i="1" dirty="0"/>
+              <a:t>[13] J. </a:t>
+            </a:r>
+            <a:r>
+              <a:rPr lang="en-US" sz="800" i="1" dirty="0" err="1"/>
+              <a:t>Yosinski</a:t>
+            </a:r>
+            <a:r>
+              <a:rPr lang="en-US" sz="800" i="1" dirty="0"/>
+              <a:t>, J. Clune, Y. </a:t>
+            </a:r>
+            <a:r>
+              <a:rPr lang="en-US" sz="800" i="1" dirty="0" err="1"/>
+              <a:t>Bengio</a:t>
+            </a:r>
+            <a:r>
+              <a:rPr lang="en-US" sz="800" i="1" dirty="0"/>
+              <a:t>, and H. Lipson, “How transferable are features in deep neural networks?” Proc. 31st Int. Conf. Machine Learning, vol. 32, pp. 647-655, 2014. </a:t>
+            </a:r>
+          </a:p>
+          <a:p>
+            <a:r>
+              <a:rPr lang="en-US" sz="800" i="1" dirty="0"/>
+              <a:t>[14] G. Christie. N. </a:t>
+            </a:r>
+            <a:r>
+              <a:rPr lang="en-US" sz="800" i="1" dirty="0" err="1"/>
+              <a:t>Fendley</a:t>
+            </a:r>
+            <a:r>
+              <a:rPr lang="en-US" sz="800" i="1" dirty="0"/>
+              <a:t>, J. Wilson, and R. Mukherjee, “Functional map of the world,” </a:t>
+            </a:r>
+            <a:r>
+              <a:rPr lang="en-US" sz="800" i="1" dirty="0" err="1"/>
+              <a:t>arXiv</a:t>
+            </a:r>
+            <a:r>
+              <a:rPr lang="en-US" sz="800" i="1" dirty="0"/>
+              <a:t> 1711.07846, 21 Nov 2017. </a:t>
+            </a:r>
+            <a:endParaRPr lang="es-ES_tradnl" sz="800" i="1" dirty="0"/>
           </a:p>
         </p:txBody>
       </p:sp>
@@ -4714,14 +5600,14 @@
           <a:p>
             <a:pPr algn="ctr"/>
             <a:r>
-              <a:rPr lang="es-ES_tradnl" sz="3600" b="1" dirty="0">
+              <a:rPr lang="es-ES_tradnl" sz="3600" b="1" dirty="0" err="1">
                 <a:solidFill>
                   <a:srgbClr val="00426F"/>
                 </a:solidFill>
                 <a:latin typeface="Times New Roman" panose="02020603050405020304" pitchFamily="18" charset="0"/>
                 <a:cs typeface="Times New Roman" panose="02020603050405020304" pitchFamily="18" charset="0"/>
               </a:rPr>
-              <a:t>Agradecimientos</a:t>
+              <a:t>Acknowledgements</a:t>
             </a:r>
             <a:endParaRPr lang="es-ES_tradnl" sz="3600" dirty="0">
               <a:solidFill>
@@ -4747,7 +5633,7 @@
         </p:nvSpPr>
         <p:spPr>
           <a:xfrm>
-            <a:off x="360219" y="28856171"/>
+            <a:off x="349582" y="28862933"/>
             <a:ext cx="10080000" cy="2088000"/>
           </a:xfrm>
           <a:prstGeom prst="rect">
@@ -4792,46 +5678,31 @@
             <a:pPr algn="just"/>
             <a:r>
               <a:rPr lang="es-ES_tradnl" sz="2000" dirty="0"/>
-              <a:t>En esta sección se incluyen agradecimientos al ITESO y a CONACYT, puede ser con el siguiente formato: </a:t>
-            </a:r>
-          </a:p>
-          <a:p>
-            <a:pPr algn="just"/>
+              <a:t>El autor agradece al </a:t>
+            </a:r>
+            <a:r>
+              <a:rPr lang="es-ES_tradnl" sz="2000" b="1" dirty="0"/>
+              <a:t>Instituto Tecnológico y de Estudios Superiores de Occidente</a:t>
+            </a:r>
             <a:r>
               <a:rPr lang="es-ES_tradnl" sz="2000" dirty="0"/>
-              <a:t>“</a:t>
-            </a:r>
-            <a:r>
-              <a:rPr lang="es-ES_tradnl" sz="2000" i="1" dirty="0"/>
-              <a:t>El autor agradece al </a:t>
-            </a:r>
-            <a:r>
-              <a:rPr lang="es-ES_tradnl" sz="2000" b="1" i="1" dirty="0"/>
-              <a:t>Instituto Tecnológico y de Estudios Superiores de Occidente</a:t>
-            </a:r>
-            <a:r>
-              <a:rPr lang="es-ES_tradnl" sz="2000" i="1" dirty="0"/>
               <a:t> (ITESO) por los recursos proporcionados para el desarrollo de este trabajo de obtención de grado. Adicionalmente, al </a:t>
             </a:r>
             <a:r>
-              <a:rPr lang="es-ES_tradnl" sz="2000" b="1" i="1" dirty="0"/>
+              <a:rPr lang="es-ES_tradnl" sz="2000" b="1" dirty="0"/>
               <a:t>Consejo Nacional de Ciencia y Tecnología</a:t>
             </a:r>
             <a:r>
-              <a:rPr lang="es-ES_tradnl" sz="2000" i="1" dirty="0"/>
+              <a:rPr lang="es-ES_tradnl" sz="2000" dirty="0"/>
               <a:t> (CONACYT) por el apoyo económico recibido a través de la beca número </a:t>
             </a:r>
             <a:r>
-              <a:rPr lang="es-ES_tradnl" sz="2000" i="1" dirty="0" err="1"/>
+              <a:rPr lang="es-ES_tradnl" sz="2000" dirty="0" err="1"/>
               <a:t>xxxxxx</a:t>
             </a:r>
             <a:r>
-              <a:rPr lang="es-ES_tradnl" sz="2000" i="1" dirty="0"/>
-              <a:t>. </a:t>
-            </a:r>
-            <a:r>
               <a:rPr lang="es-ES_tradnl" sz="2000" dirty="0"/>
-              <a:t>“</a:t>
+              <a:t>.</a:t>
             </a:r>
           </a:p>
         </p:txBody>
@@ -4909,6 +5780,156 @@
           <a:xfrm>
             <a:off x="216651" y="31497096"/>
             <a:ext cx="2973600" cy="719925"/>
+          </a:xfrm>
+          <a:prstGeom prst="rect">
+            <a:avLst/>
+          </a:prstGeom>
+        </p:spPr>
+      </p:pic>
+      <p:pic>
+        <p:nvPicPr>
+          <p:cNvPr id="35" name="Imagen 34">
+            <a:extLst>
+              <a:ext uri="{FF2B5EF4-FFF2-40B4-BE49-F238E27FC236}">
+                <a16:creationId xmlns:a16="http://schemas.microsoft.com/office/drawing/2014/main" id="{0BB864EF-36EB-4350-B50C-EC4D1C805642}"/>
+              </a:ext>
+            </a:extLst>
+          </p:cNvPr>
+          <p:cNvPicPr>
+            <a:picLocks noChangeAspect="1"/>
+          </p:cNvPicPr>
+          <p:nvPr/>
+        </p:nvPicPr>
+        <p:blipFill>
+          <a:blip r:embed="rId5"/>
+          <a:stretch>
+            <a:fillRect/>
+          </a:stretch>
+        </p:blipFill>
+        <p:spPr>
+          <a:xfrm>
+            <a:off x="1963542" y="23415124"/>
+            <a:ext cx="6241758" cy="848250"/>
+          </a:xfrm>
+          <a:prstGeom prst="rect">
+            <a:avLst/>
+          </a:prstGeom>
+        </p:spPr>
+      </p:pic>
+      <p:pic>
+        <p:nvPicPr>
+          <p:cNvPr id="38" name="Imagen 37">
+            <a:extLst>
+              <a:ext uri="{FF2B5EF4-FFF2-40B4-BE49-F238E27FC236}">
+                <a16:creationId xmlns:a16="http://schemas.microsoft.com/office/drawing/2014/main" id="{B805712E-7300-430D-ADB1-4305549E48E6}"/>
+              </a:ext>
+            </a:extLst>
+          </p:cNvPr>
+          <p:cNvPicPr>
+            <a:picLocks noChangeAspect="1"/>
+          </p:cNvPicPr>
+          <p:nvPr/>
+        </p:nvPicPr>
+        <p:blipFill>
+          <a:blip r:embed="rId6"/>
+          <a:stretch>
+            <a:fillRect/>
+          </a:stretch>
+        </p:blipFill>
+        <p:spPr>
+          <a:xfrm>
+            <a:off x="2979357" y="24277137"/>
+            <a:ext cx="3856164" cy="3128062"/>
+          </a:xfrm>
+          <a:prstGeom prst="rect">
+            <a:avLst/>
+          </a:prstGeom>
+        </p:spPr>
+      </p:pic>
+      <p:pic>
+        <p:nvPicPr>
+          <p:cNvPr id="2" name="Imagen 1">
+            <a:extLst>
+              <a:ext uri="{FF2B5EF4-FFF2-40B4-BE49-F238E27FC236}">
+                <a16:creationId xmlns:a16="http://schemas.microsoft.com/office/drawing/2014/main" id="{A47B23D0-54A1-4763-B10F-AFA6A85A733E}"/>
+              </a:ext>
+            </a:extLst>
+          </p:cNvPr>
+          <p:cNvPicPr>
+            <a:picLocks noChangeAspect="1"/>
+          </p:cNvPicPr>
+          <p:nvPr/>
+        </p:nvPicPr>
+        <p:blipFill>
+          <a:blip r:embed="rId7"/>
+          <a:stretch>
+            <a:fillRect/>
+          </a:stretch>
+        </p:blipFill>
+        <p:spPr>
+          <a:xfrm>
+            <a:off x="14151205" y="25146302"/>
+            <a:ext cx="3429329" cy="2160426"/>
+          </a:xfrm>
+          <a:prstGeom prst="rect">
+            <a:avLst/>
+          </a:prstGeom>
+        </p:spPr>
+      </p:pic>
+      <p:pic>
+        <p:nvPicPr>
+          <p:cNvPr id="4" name="Imagen 3">
+            <a:extLst>
+              <a:ext uri="{FF2B5EF4-FFF2-40B4-BE49-F238E27FC236}">
+                <a16:creationId xmlns:a16="http://schemas.microsoft.com/office/drawing/2014/main" id="{A4103D7F-C7BB-4E93-B801-32D99AA28505}"/>
+              </a:ext>
+            </a:extLst>
+          </p:cNvPr>
+          <p:cNvPicPr>
+            <a:picLocks noChangeAspect="1"/>
+          </p:cNvPicPr>
+          <p:nvPr/>
+        </p:nvPicPr>
+        <p:blipFill>
+          <a:blip r:embed="rId8"/>
+          <a:stretch>
+            <a:fillRect/>
+          </a:stretch>
+        </p:blipFill>
+        <p:spPr>
+          <a:xfrm>
+            <a:off x="12153900" y="9152292"/>
+            <a:ext cx="3244463" cy="3244463"/>
+          </a:xfrm>
+          <a:prstGeom prst="rect">
+            <a:avLst/>
+          </a:prstGeom>
+        </p:spPr>
+      </p:pic>
+      <p:pic>
+        <p:nvPicPr>
+          <p:cNvPr id="6" name="Imagen 5" descr="Imagen que contiene reloj, negro, blanco, ciudad&#10;&#10;Descripción generada automáticamente">
+            <a:extLst>
+              <a:ext uri="{FF2B5EF4-FFF2-40B4-BE49-F238E27FC236}">
+                <a16:creationId xmlns:a16="http://schemas.microsoft.com/office/drawing/2014/main" id="{583E0A85-DD98-4E78-B767-ABC81BD1619D}"/>
+              </a:ext>
+            </a:extLst>
+          </p:cNvPr>
+          <p:cNvPicPr>
+            <a:picLocks noChangeAspect="1"/>
+          </p:cNvPicPr>
+          <p:nvPr/>
+        </p:nvPicPr>
+        <p:blipFill>
+          <a:blip r:embed="rId9"/>
+          <a:stretch>
+            <a:fillRect/>
+          </a:stretch>
+        </p:blipFill>
+        <p:spPr>
+          <a:xfrm>
+            <a:off x="16945534" y="9135577"/>
+            <a:ext cx="3288496" cy="3288496"/>
           </a:xfrm>
           <a:prstGeom prst="rect">
             <a:avLst/>

</xml_diff>